<commit_message>
dat.gui labels and units
</commit_message>
<xml_diff>
--- a/doc/prezentace.pptx
+++ b/doc/prezentace.pptx
@@ -114,6 +114,11 @@
       </a:defRPr>
     </a:lvl9pPr>
   </p:defaultTextStyle>
+  <p:extLst>
+    <p:ext uri="{EFAFB233-063F-42B5-8137-9DF3F51BA10A}">
+      <p15:sldGuideLst xmlns:p15="http://schemas.microsoft.com/office/powerpoint/2012/main"/>
+    </p:ext>
+  </p:extLst>
 </p:presentation>
 </file>
 
@@ -199,7 +204,7 @@
           <a:p>
             <a:fld id="{8A6AE919-2F97-4E0F-8658-E15C873477CD}" type="datetimeFigureOut">
               <a:rPr lang="en-GB" smtClean="0"/>
-              <a:t>02/03/2015</a:t>
+              <a:t>03/03/2015</a:t>
             </a:fld>
             <a:endParaRPr lang="en-GB"/>
           </a:p>
@@ -1091,7 +1096,7 @@
           <a:p>
             <a:fld id="{F950B390-F1A7-4EBA-8BC8-35E8FDAF84E6}" type="datetimeFigureOut">
               <a:rPr lang="en-GB" smtClean="0"/>
-              <a:t>02/03/2015</a:t>
+              <a:t>03/03/2015</a:t>
             </a:fld>
             <a:endParaRPr lang="en-GB"/>
           </a:p>
@@ -1261,7 +1266,7 @@
           <a:p>
             <a:fld id="{F950B390-F1A7-4EBA-8BC8-35E8FDAF84E6}" type="datetimeFigureOut">
               <a:rPr lang="en-GB" smtClean="0"/>
-              <a:t>02/03/2015</a:t>
+              <a:t>03/03/2015</a:t>
             </a:fld>
             <a:endParaRPr lang="en-GB"/>
           </a:p>
@@ -1441,7 +1446,7 @@
           <a:p>
             <a:fld id="{F950B390-F1A7-4EBA-8BC8-35E8FDAF84E6}" type="datetimeFigureOut">
               <a:rPr lang="en-GB" smtClean="0"/>
-              <a:t>02/03/2015</a:t>
+              <a:t>03/03/2015</a:t>
             </a:fld>
             <a:endParaRPr lang="en-GB"/>
           </a:p>
@@ -1611,7 +1616,7 @@
           <a:p>
             <a:fld id="{F950B390-F1A7-4EBA-8BC8-35E8FDAF84E6}" type="datetimeFigureOut">
               <a:rPr lang="en-GB" smtClean="0"/>
-              <a:t>02/03/2015</a:t>
+              <a:t>03/03/2015</a:t>
             </a:fld>
             <a:endParaRPr lang="en-GB"/>
           </a:p>
@@ -1857,7 +1862,7 @@
           <a:p>
             <a:fld id="{F950B390-F1A7-4EBA-8BC8-35E8FDAF84E6}" type="datetimeFigureOut">
               <a:rPr lang="en-GB" smtClean="0"/>
-              <a:t>02/03/2015</a:t>
+              <a:t>03/03/2015</a:t>
             </a:fld>
             <a:endParaRPr lang="en-GB"/>
           </a:p>
@@ -2089,7 +2094,7 @@
           <a:p>
             <a:fld id="{F950B390-F1A7-4EBA-8BC8-35E8FDAF84E6}" type="datetimeFigureOut">
               <a:rPr lang="en-GB" smtClean="0"/>
-              <a:t>02/03/2015</a:t>
+              <a:t>03/03/2015</a:t>
             </a:fld>
             <a:endParaRPr lang="en-GB"/>
           </a:p>
@@ -2456,7 +2461,7 @@
           <a:p>
             <a:fld id="{F950B390-F1A7-4EBA-8BC8-35E8FDAF84E6}" type="datetimeFigureOut">
               <a:rPr lang="en-GB" smtClean="0"/>
-              <a:t>02/03/2015</a:t>
+              <a:t>03/03/2015</a:t>
             </a:fld>
             <a:endParaRPr lang="en-GB"/>
           </a:p>
@@ -2574,7 +2579,7 @@
           <a:p>
             <a:fld id="{F950B390-F1A7-4EBA-8BC8-35E8FDAF84E6}" type="datetimeFigureOut">
               <a:rPr lang="en-GB" smtClean="0"/>
-              <a:t>02/03/2015</a:t>
+              <a:t>03/03/2015</a:t>
             </a:fld>
             <a:endParaRPr lang="en-GB"/>
           </a:p>
@@ -2669,7 +2674,7 @@
           <a:p>
             <a:fld id="{F950B390-F1A7-4EBA-8BC8-35E8FDAF84E6}" type="datetimeFigureOut">
               <a:rPr lang="en-GB" smtClean="0"/>
-              <a:t>02/03/2015</a:t>
+              <a:t>03/03/2015</a:t>
             </a:fld>
             <a:endParaRPr lang="en-GB"/>
           </a:p>
@@ -2946,7 +2951,7 @@
           <a:p>
             <a:fld id="{F950B390-F1A7-4EBA-8BC8-35E8FDAF84E6}" type="datetimeFigureOut">
               <a:rPr lang="en-GB" smtClean="0"/>
-              <a:t>02/03/2015</a:t>
+              <a:t>03/03/2015</a:t>
             </a:fld>
             <a:endParaRPr lang="en-GB"/>
           </a:p>
@@ -3199,7 +3204,7 @@
           <a:p>
             <a:fld id="{F950B390-F1A7-4EBA-8BC8-35E8FDAF84E6}" type="datetimeFigureOut">
               <a:rPr lang="en-GB" smtClean="0"/>
-              <a:t>02/03/2015</a:t>
+              <a:t>03/03/2015</a:t>
             </a:fld>
             <a:endParaRPr lang="en-GB"/>
           </a:p>
@@ -3412,7 +3417,7 @@
           <a:p>
             <a:fld id="{F950B390-F1A7-4EBA-8BC8-35E8FDAF84E6}" type="datetimeFigureOut">
               <a:rPr lang="en-GB" smtClean="0"/>
-              <a:t>02/03/2015</a:t>
+              <a:t>03/03/2015</a:t>
             </a:fld>
             <a:endParaRPr lang="en-GB"/>
           </a:p>
@@ -3833,12 +3838,8 @@
           <a:lstStyle/>
           <a:p>
             <a:r>
-              <a:rPr lang="cs-CZ" dirty="0" err="1" smtClean="0"/>
-              <a:t>Wienerův</a:t>
-            </a:r>
-            <a:r>
               <a:rPr lang="cs-CZ" dirty="0" smtClean="0"/>
-              <a:t> pokus</a:t>
+              <a:t>Wienerův pokus</a:t>
             </a:r>
             <a:endParaRPr lang="en-GB" dirty="0"/>
           </a:p>

</xml_diff>